<commit_message>
added file for screenshots
</commit_message>
<xml_diff>
--- a/Презентация.pptx
+++ b/Презентация.pptx
@@ -9444,28 +9444,28 @@
               <a:t>и получает данные о </a:t>
             </a:r>
             <a:r>
-              <a:rPr lang="ru-RU" sz="2000" dirty="0" err="1" smtClean="0">
-                <a:latin typeface="SF UI Text" panose="00000400000000000000" pitchFamily="2" charset="0"/>
-              </a:rPr>
-              <a:t>мероприиятиях</a:t>
-            </a:r>
-            <a:r>
               <a:rPr lang="ru-RU" sz="2000" dirty="0" smtClean="0">
                 <a:latin typeface="SF UI Text" panose="00000400000000000000" pitchFamily="2" charset="0"/>
               </a:rPr>
-              <a:t> и </a:t>
-            </a:r>
-            <a:r>
-              <a:rPr lang="ru-RU" sz="2000" dirty="0" err="1" smtClean="0">
+              <a:t>мероприятиях </a:t>
+            </a:r>
+            <a:r>
+              <a:rPr lang="ru-RU" sz="2000" smtClean="0">
                 <a:latin typeface="SF UI Text" panose="00000400000000000000" pitchFamily="2" charset="0"/>
               </a:rPr>
-              <a:t>выводид</a:t>
+              <a:t>и </a:t>
+            </a:r>
+            <a:r>
+              <a:rPr lang="ru-RU" sz="2000" smtClean="0">
+                <a:latin typeface="SF UI Text" panose="00000400000000000000" pitchFamily="2" charset="0"/>
+              </a:rPr>
+              <a:t>выводит </a:t>
             </a:r>
             <a:r>
               <a:rPr lang="ru-RU" sz="2000" dirty="0" smtClean="0">
                 <a:latin typeface="SF UI Text" panose="00000400000000000000" pitchFamily="2" charset="0"/>
               </a:rPr>
-              <a:t> их  на экран.</a:t>
+              <a:t>их  на экран.</a:t>
             </a:r>
           </a:p>
           <a:p>

</xml_diff>